<commit_message>
Modification dans inex et Model UI
</commit_message>
<xml_diff>
--- a/UI-model/UI design Fortico.pptx
+++ b/UI-model/UI design Fortico.pptx
@@ -5,12 +5,14 @@
     <p:sldMasterId id="2147483648" r:id="rId1"/>
   </p:sldMasterIdLst>
   <p:notesMasterIdLst>
-    <p:notesMasterId r:id="rId5"/>
+    <p:notesMasterId r:id="rId7"/>
   </p:notesMasterIdLst>
   <p:sldIdLst>
     <p:sldId id="256" r:id="rId2"/>
     <p:sldId id="257" r:id="rId3"/>
     <p:sldId id="258" r:id="rId4"/>
+    <p:sldId id="259" r:id="rId5"/>
+    <p:sldId id="260" r:id="rId6"/>
   </p:sldIdLst>
   <p:sldSz cx="12192000" cy="6858000"/>
   <p:notesSz cx="6858000" cy="9144000"/>
@@ -199,7 +201,7 @@
           <a:p>
             <a:fld id="{4D4BAD99-9C6E-438B-B6E2-4A70BF6BDDF4}" type="datetimeFigureOut">
               <a:rPr lang="fr-FR" smtClean="0"/>
-              <a:t>07/05/2025</a:t>
+              <a:t>08/05/2025</a:t>
             </a:fld>
             <a:endParaRPr lang="fr-FR"/>
           </a:p>
@@ -766,7 +768,7 @@
           <a:p>
             <a:fld id="{5F5282B9-BFE5-4D13-8D8C-5297D4C42E3B}" type="datetimeFigureOut">
               <a:rPr lang="fr-FR" smtClean="0"/>
-              <a:t>07/05/2025</a:t>
+              <a:t>08/05/2025</a:t>
             </a:fld>
             <a:endParaRPr lang="fr-FR"/>
           </a:p>
@@ -936,7 +938,7 @@
           <a:p>
             <a:fld id="{5F5282B9-BFE5-4D13-8D8C-5297D4C42E3B}" type="datetimeFigureOut">
               <a:rPr lang="fr-FR" smtClean="0"/>
-              <a:t>07/05/2025</a:t>
+              <a:t>08/05/2025</a:t>
             </a:fld>
             <a:endParaRPr lang="fr-FR"/>
           </a:p>
@@ -1116,7 +1118,7 @@
           <a:p>
             <a:fld id="{5F5282B9-BFE5-4D13-8D8C-5297D4C42E3B}" type="datetimeFigureOut">
               <a:rPr lang="fr-FR" smtClean="0"/>
-              <a:t>07/05/2025</a:t>
+              <a:t>08/05/2025</a:t>
             </a:fld>
             <a:endParaRPr lang="fr-FR"/>
           </a:p>
@@ -1286,7 +1288,7 @@
           <a:p>
             <a:fld id="{5F5282B9-BFE5-4D13-8D8C-5297D4C42E3B}" type="datetimeFigureOut">
               <a:rPr lang="fr-FR" smtClean="0"/>
-              <a:t>07/05/2025</a:t>
+              <a:t>08/05/2025</a:t>
             </a:fld>
             <a:endParaRPr lang="fr-FR"/>
           </a:p>
@@ -1532,7 +1534,7 @@
           <a:p>
             <a:fld id="{5F5282B9-BFE5-4D13-8D8C-5297D4C42E3B}" type="datetimeFigureOut">
               <a:rPr lang="fr-FR" smtClean="0"/>
-              <a:t>07/05/2025</a:t>
+              <a:t>08/05/2025</a:t>
             </a:fld>
             <a:endParaRPr lang="fr-FR"/>
           </a:p>
@@ -1764,7 +1766,7 @@
           <a:p>
             <a:fld id="{5F5282B9-BFE5-4D13-8D8C-5297D4C42E3B}" type="datetimeFigureOut">
               <a:rPr lang="fr-FR" smtClean="0"/>
-              <a:t>07/05/2025</a:t>
+              <a:t>08/05/2025</a:t>
             </a:fld>
             <a:endParaRPr lang="fr-FR"/>
           </a:p>
@@ -2131,7 +2133,7 @@
           <a:p>
             <a:fld id="{5F5282B9-BFE5-4D13-8D8C-5297D4C42E3B}" type="datetimeFigureOut">
               <a:rPr lang="fr-FR" smtClean="0"/>
-              <a:t>07/05/2025</a:t>
+              <a:t>08/05/2025</a:t>
             </a:fld>
             <a:endParaRPr lang="fr-FR"/>
           </a:p>
@@ -2249,7 +2251,7 @@
           <a:p>
             <a:fld id="{5F5282B9-BFE5-4D13-8D8C-5297D4C42E3B}" type="datetimeFigureOut">
               <a:rPr lang="fr-FR" smtClean="0"/>
-              <a:t>07/05/2025</a:t>
+              <a:t>08/05/2025</a:t>
             </a:fld>
             <a:endParaRPr lang="fr-FR"/>
           </a:p>
@@ -2344,7 +2346,7 @@
           <a:p>
             <a:fld id="{5F5282B9-BFE5-4D13-8D8C-5297D4C42E3B}" type="datetimeFigureOut">
               <a:rPr lang="fr-FR" smtClean="0"/>
-              <a:t>07/05/2025</a:t>
+              <a:t>08/05/2025</a:t>
             </a:fld>
             <a:endParaRPr lang="fr-FR"/>
           </a:p>
@@ -2621,7 +2623,7 @@
           <a:p>
             <a:fld id="{5F5282B9-BFE5-4D13-8D8C-5297D4C42E3B}" type="datetimeFigureOut">
               <a:rPr lang="fr-FR" smtClean="0"/>
-              <a:t>07/05/2025</a:t>
+              <a:t>08/05/2025</a:t>
             </a:fld>
             <a:endParaRPr lang="fr-FR"/>
           </a:p>
@@ -2874,7 +2876,7 @@
           <a:p>
             <a:fld id="{5F5282B9-BFE5-4D13-8D8C-5297D4C42E3B}" type="datetimeFigureOut">
               <a:rPr lang="fr-FR" smtClean="0"/>
-              <a:t>07/05/2025</a:t>
+              <a:t>08/05/2025</a:t>
             </a:fld>
             <a:endParaRPr lang="fr-FR"/>
           </a:p>
@@ -3087,7 +3089,7 @@
           <a:p>
             <a:fld id="{5F5282B9-BFE5-4D13-8D8C-5297D4C42E3B}" type="datetimeFigureOut">
               <a:rPr lang="fr-FR" smtClean="0"/>
-              <a:t>07/05/2025</a:t>
+              <a:t>08/05/2025</a:t>
             </a:fld>
             <a:endParaRPr lang="fr-FR"/>
           </a:p>
@@ -10363,6 +10365,462 @@
           </a:p>
         </p:txBody>
       </p:sp>
+      <p:sp>
+        <p:nvSpPr>
+          <p:cNvPr id="54" name="ZoneTexte 53"/>
+          <p:cNvSpPr txBox="1"/>
+          <p:nvPr/>
+        </p:nvSpPr>
+        <p:spPr>
+          <a:xfrm>
+            <a:off x="4873313" y="-63838"/>
+            <a:ext cx="680598" cy="584775"/>
+          </a:xfrm>
+          <a:prstGeom prst="rect">
+            <a:avLst/>
+          </a:prstGeom>
+          <a:noFill/>
+        </p:spPr>
+        <p:txBody>
+          <a:bodyPr wrap="square" rtlCol="0">
+            <a:spAutoFit/>
+          </a:bodyPr>
+          <a:lstStyle/>
+          <a:p>
+            <a:pPr algn="ctr"/>
+            <a:r>
+              <a:rPr lang="fr-FR" sz="3200" dirty="0" smtClean="0">
+                <a:solidFill>
+                  <a:srgbClr val="FFFFFF"/>
+                </a:solidFill>
+                <a:latin typeface="Arial Black" panose="020B0A04020102020204" pitchFamily="34" charset="0"/>
+              </a:rPr>
+              <a:t>1</a:t>
+            </a:r>
+            <a:endParaRPr lang="fr-FR" sz="3200" dirty="0">
+              <a:solidFill>
+                <a:srgbClr val="FFFFFF"/>
+              </a:solidFill>
+              <a:latin typeface="Arial Black" panose="020B0A04020102020204" pitchFamily="34" charset="0"/>
+            </a:endParaRPr>
+          </a:p>
+        </p:txBody>
+      </p:sp>
+      <p:sp>
+        <p:nvSpPr>
+          <p:cNvPr id="90" name="ZoneTexte 89"/>
+          <p:cNvSpPr txBox="1"/>
+          <p:nvPr/>
+        </p:nvSpPr>
+        <p:spPr>
+          <a:xfrm>
+            <a:off x="470793" y="895841"/>
+            <a:ext cx="680598" cy="584775"/>
+          </a:xfrm>
+          <a:prstGeom prst="rect">
+            <a:avLst/>
+          </a:prstGeom>
+          <a:noFill/>
+        </p:spPr>
+        <p:txBody>
+          <a:bodyPr wrap="square" rtlCol="0">
+            <a:spAutoFit/>
+          </a:bodyPr>
+          <a:lstStyle/>
+          <a:p>
+            <a:pPr algn="ctr"/>
+            <a:r>
+              <a:rPr lang="fr-FR" sz="3200" dirty="0" smtClean="0">
+                <a:latin typeface="Arial Black" panose="020B0A04020102020204" pitchFamily="34" charset="0"/>
+              </a:rPr>
+              <a:t>2</a:t>
+            </a:r>
+            <a:endParaRPr lang="fr-FR" sz="3200" dirty="0">
+              <a:latin typeface="Arial Black" panose="020B0A04020102020204" pitchFamily="34" charset="0"/>
+            </a:endParaRPr>
+          </a:p>
+        </p:txBody>
+      </p:sp>
+      <p:sp>
+        <p:nvSpPr>
+          <p:cNvPr id="96" name="ZoneTexte 95"/>
+          <p:cNvSpPr txBox="1"/>
+          <p:nvPr/>
+        </p:nvSpPr>
+        <p:spPr>
+          <a:xfrm>
+            <a:off x="4562752" y="1576520"/>
+            <a:ext cx="680598" cy="584775"/>
+          </a:xfrm>
+          <a:prstGeom prst="rect">
+            <a:avLst/>
+          </a:prstGeom>
+          <a:noFill/>
+        </p:spPr>
+        <p:txBody>
+          <a:bodyPr wrap="square" rtlCol="0">
+            <a:spAutoFit/>
+          </a:bodyPr>
+          <a:lstStyle/>
+          <a:p>
+            <a:pPr algn="ctr"/>
+            <a:r>
+              <a:rPr lang="fr-FR" sz="3200" dirty="0" smtClean="0">
+                <a:solidFill>
+                  <a:srgbClr val="FFFFFF"/>
+                </a:solidFill>
+                <a:latin typeface="Arial Black" panose="020B0A04020102020204" pitchFamily="34" charset="0"/>
+              </a:rPr>
+              <a:t>3</a:t>
+            </a:r>
+            <a:endParaRPr lang="fr-FR" sz="3200" dirty="0">
+              <a:solidFill>
+                <a:srgbClr val="FFFFFF"/>
+              </a:solidFill>
+              <a:latin typeface="Arial Black" panose="020B0A04020102020204" pitchFamily="34" charset="0"/>
+            </a:endParaRPr>
+          </a:p>
+        </p:txBody>
+      </p:sp>
+      <p:sp>
+        <p:nvSpPr>
+          <p:cNvPr id="97" name="ZoneTexte 96"/>
+          <p:cNvSpPr txBox="1"/>
+          <p:nvPr/>
+        </p:nvSpPr>
+        <p:spPr>
+          <a:xfrm>
+            <a:off x="592794" y="3646423"/>
+            <a:ext cx="680598" cy="584775"/>
+          </a:xfrm>
+          <a:prstGeom prst="rect">
+            <a:avLst/>
+          </a:prstGeom>
+          <a:noFill/>
+        </p:spPr>
+        <p:txBody>
+          <a:bodyPr wrap="square" rtlCol="0">
+            <a:spAutoFit/>
+          </a:bodyPr>
+          <a:lstStyle/>
+          <a:p>
+            <a:pPr algn="ctr"/>
+            <a:r>
+              <a:rPr lang="fr-FR" sz="3200" dirty="0" smtClean="0">
+                <a:solidFill>
+                  <a:srgbClr val="FFFFFF"/>
+                </a:solidFill>
+                <a:latin typeface="Arial Black" panose="020B0A04020102020204" pitchFamily="34" charset="0"/>
+              </a:rPr>
+              <a:t>4</a:t>
+            </a:r>
+            <a:endParaRPr lang="fr-FR" sz="3200" dirty="0">
+              <a:solidFill>
+                <a:srgbClr val="FFFFFF"/>
+              </a:solidFill>
+              <a:latin typeface="Arial Black" panose="020B0A04020102020204" pitchFamily="34" charset="0"/>
+            </a:endParaRPr>
+          </a:p>
+        </p:txBody>
+      </p:sp>
+      <p:sp>
+        <p:nvSpPr>
+          <p:cNvPr id="98" name="ZoneTexte 97"/>
+          <p:cNvSpPr txBox="1"/>
+          <p:nvPr/>
+        </p:nvSpPr>
+        <p:spPr>
+          <a:xfrm>
+            <a:off x="9595596" y="890667"/>
+            <a:ext cx="680598" cy="584775"/>
+          </a:xfrm>
+          <a:prstGeom prst="rect">
+            <a:avLst/>
+          </a:prstGeom>
+          <a:noFill/>
+        </p:spPr>
+        <p:txBody>
+          <a:bodyPr wrap="square" rtlCol="0">
+            <a:spAutoFit/>
+          </a:bodyPr>
+          <a:lstStyle/>
+          <a:p>
+            <a:pPr algn="ctr"/>
+            <a:r>
+              <a:rPr lang="fr-FR" sz="3200" dirty="0" smtClean="0">
+                <a:solidFill>
+                  <a:srgbClr val="FFFFFF"/>
+                </a:solidFill>
+                <a:latin typeface="Arial Black" panose="020B0A04020102020204" pitchFamily="34" charset="0"/>
+              </a:rPr>
+              <a:t>5</a:t>
+            </a:r>
+            <a:endParaRPr lang="fr-FR" sz="3200" dirty="0">
+              <a:solidFill>
+                <a:srgbClr val="FFFFFF"/>
+              </a:solidFill>
+              <a:latin typeface="Arial Black" panose="020B0A04020102020204" pitchFamily="34" charset="0"/>
+            </a:endParaRPr>
+          </a:p>
+        </p:txBody>
+      </p:sp>
+      <p:sp>
+        <p:nvSpPr>
+          <p:cNvPr id="99" name="ZoneTexte 98"/>
+          <p:cNvSpPr txBox="1"/>
+          <p:nvPr/>
+        </p:nvSpPr>
+        <p:spPr>
+          <a:xfrm>
+            <a:off x="8529623" y="2681064"/>
+            <a:ext cx="680598" cy="584775"/>
+          </a:xfrm>
+          <a:prstGeom prst="rect">
+            <a:avLst/>
+          </a:prstGeom>
+          <a:noFill/>
+        </p:spPr>
+        <p:txBody>
+          <a:bodyPr wrap="square" rtlCol="0">
+            <a:spAutoFit/>
+          </a:bodyPr>
+          <a:lstStyle/>
+          <a:p>
+            <a:pPr algn="ctr"/>
+            <a:r>
+              <a:rPr lang="fr-FR" sz="3200" dirty="0" smtClean="0">
+                <a:solidFill>
+                  <a:srgbClr val="FFFFFF"/>
+                </a:solidFill>
+                <a:latin typeface="Arial Black" panose="020B0A04020102020204" pitchFamily="34" charset="0"/>
+              </a:rPr>
+              <a:t>6</a:t>
+            </a:r>
+            <a:endParaRPr lang="fr-FR" sz="3200" dirty="0">
+              <a:solidFill>
+                <a:srgbClr val="FFFFFF"/>
+              </a:solidFill>
+              <a:latin typeface="Arial Black" panose="020B0A04020102020204" pitchFamily="34" charset="0"/>
+            </a:endParaRPr>
+          </a:p>
+        </p:txBody>
+      </p:sp>
+      <p:sp>
+        <p:nvSpPr>
+          <p:cNvPr id="100" name="ZoneTexte 99"/>
+          <p:cNvSpPr txBox="1"/>
+          <p:nvPr/>
+        </p:nvSpPr>
+        <p:spPr>
+          <a:xfrm>
+            <a:off x="10650268" y="2729975"/>
+            <a:ext cx="680598" cy="584775"/>
+          </a:xfrm>
+          <a:prstGeom prst="rect">
+            <a:avLst/>
+          </a:prstGeom>
+          <a:noFill/>
+        </p:spPr>
+        <p:txBody>
+          <a:bodyPr wrap="square" rtlCol="0">
+            <a:spAutoFit/>
+          </a:bodyPr>
+          <a:lstStyle/>
+          <a:p>
+            <a:pPr algn="ctr"/>
+            <a:r>
+              <a:rPr lang="fr-FR" sz="3200" dirty="0" smtClean="0">
+                <a:solidFill>
+                  <a:srgbClr val="FFFFFF"/>
+                </a:solidFill>
+                <a:latin typeface="Arial Black" panose="020B0A04020102020204" pitchFamily="34" charset="0"/>
+              </a:rPr>
+              <a:t>6</a:t>
+            </a:r>
+            <a:endParaRPr lang="fr-FR" sz="3200" dirty="0">
+              <a:solidFill>
+                <a:srgbClr val="FFFFFF"/>
+              </a:solidFill>
+              <a:latin typeface="Arial Black" panose="020B0A04020102020204" pitchFamily="34" charset="0"/>
+            </a:endParaRPr>
+          </a:p>
+        </p:txBody>
+      </p:sp>
+      <p:sp>
+        <p:nvSpPr>
+          <p:cNvPr id="104" name="ZoneTexte 103"/>
+          <p:cNvSpPr txBox="1"/>
+          <p:nvPr/>
+        </p:nvSpPr>
+        <p:spPr>
+          <a:xfrm>
+            <a:off x="3615635" y="4425609"/>
+            <a:ext cx="680598" cy="584775"/>
+          </a:xfrm>
+          <a:prstGeom prst="rect">
+            <a:avLst/>
+          </a:prstGeom>
+          <a:noFill/>
+        </p:spPr>
+        <p:txBody>
+          <a:bodyPr wrap="square" rtlCol="0">
+            <a:spAutoFit/>
+          </a:bodyPr>
+          <a:lstStyle/>
+          <a:p>
+            <a:pPr algn="ctr"/>
+            <a:r>
+              <a:rPr lang="fr-FR" sz="3200" dirty="0" smtClean="0">
+                <a:latin typeface="Arial Black" panose="020B0A04020102020204" pitchFamily="34" charset="0"/>
+              </a:rPr>
+              <a:t>7</a:t>
+            </a:r>
+            <a:endParaRPr lang="fr-FR" sz="3200" dirty="0">
+              <a:latin typeface="Arial Black" panose="020B0A04020102020204" pitchFamily="34" charset="0"/>
+            </a:endParaRPr>
+          </a:p>
+        </p:txBody>
+      </p:sp>
+      <p:sp>
+        <p:nvSpPr>
+          <p:cNvPr id="108" name="ZoneTexte 107"/>
+          <p:cNvSpPr txBox="1"/>
+          <p:nvPr/>
+        </p:nvSpPr>
+        <p:spPr>
+          <a:xfrm>
+            <a:off x="2245591" y="4458550"/>
+            <a:ext cx="680598" cy="584775"/>
+          </a:xfrm>
+          <a:prstGeom prst="rect">
+            <a:avLst/>
+          </a:prstGeom>
+          <a:noFill/>
+        </p:spPr>
+        <p:txBody>
+          <a:bodyPr wrap="square" rtlCol="0">
+            <a:spAutoFit/>
+          </a:bodyPr>
+          <a:lstStyle/>
+          <a:p>
+            <a:pPr algn="ctr"/>
+            <a:r>
+              <a:rPr lang="fr-FR" sz="3200" dirty="0" smtClean="0">
+                <a:latin typeface="Arial Black" panose="020B0A04020102020204" pitchFamily="34" charset="0"/>
+              </a:rPr>
+              <a:t>7</a:t>
+            </a:r>
+            <a:endParaRPr lang="fr-FR" sz="3200" dirty="0">
+              <a:latin typeface="Arial Black" panose="020B0A04020102020204" pitchFamily="34" charset="0"/>
+            </a:endParaRPr>
+          </a:p>
+        </p:txBody>
+      </p:sp>
+      <p:sp>
+        <p:nvSpPr>
+          <p:cNvPr id="115" name="ZoneTexte 114"/>
+          <p:cNvSpPr txBox="1"/>
+          <p:nvPr/>
+        </p:nvSpPr>
+        <p:spPr>
+          <a:xfrm>
+            <a:off x="5067989" y="4493886"/>
+            <a:ext cx="680598" cy="584775"/>
+          </a:xfrm>
+          <a:prstGeom prst="rect">
+            <a:avLst/>
+          </a:prstGeom>
+          <a:noFill/>
+        </p:spPr>
+        <p:txBody>
+          <a:bodyPr wrap="square" rtlCol="0">
+            <a:spAutoFit/>
+          </a:bodyPr>
+          <a:lstStyle/>
+          <a:p>
+            <a:pPr algn="ctr"/>
+            <a:r>
+              <a:rPr lang="fr-FR" sz="3200" dirty="0" smtClean="0">
+                <a:latin typeface="Arial Black" panose="020B0A04020102020204" pitchFamily="34" charset="0"/>
+              </a:rPr>
+              <a:t>7</a:t>
+            </a:r>
+            <a:endParaRPr lang="fr-FR" sz="3200" dirty="0">
+              <a:latin typeface="Arial Black" panose="020B0A04020102020204" pitchFamily="34" charset="0"/>
+            </a:endParaRPr>
+          </a:p>
+        </p:txBody>
+      </p:sp>
+      <p:sp>
+        <p:nvSpPr>
+          <p:cNvPr id="117" name="ZoneTexte 116"/>
+          <p:cNvSpPr txBox="1"/>
+          <p:nvPr/>
+        </p:nvSpPr>
+        <p:spPr>
+          <a:xfrm>
+            <a:off x="6468535" y="4475941"/>
+            <a:ext cx="680598" cy="584775"/>
+          </a:xfrm>
+          <a:prstGeom prst="rect">
+            <a:avLst/>
+          </a:prstGeom>
+          <a:noFill/>
+        </p:spPr>
+        <p:txBody>
+          <a:bodyPr wrap="square" rtlCol="0">
+            <a:spAutoFit/>
+          </a:bodyPr>
+          <a:lstStyle/>
+          <a:p>
+            <a:pPr algn="ctr"/>
+            <a:r>
+              <a:rPr lang="fr-FR" sz="3200" dirty="0" smtClean="0">
+                <a:latin typeface="Arial Black" panose="020B0A04020102020204" pitchFamily="34" charset="0"/>
+              </a:rPr>
+              <a:t>7</a:t>
+            </a:r>
+            <a:endParaRPr lang="fr-FR" sz="3200" dirty="0">
+              <a:latin typeface="Arial Black" panose="020B0A04020102020204" pitchFamily="34" charset="0"/>
+            </a:endParaRPr>
+          </a:p>
+        </p:txBody>
+      </p:sp>
+      <p:sp>
+        <p:nvSpPr>
+          <p:cNvPr id="118" name="ZoneTexte 117"/>
+          <p:cNvSpPr txBox="1"/>
+          <p:nvPr/>
+        </p:nvSpPr>
+        <p:spPr>
+          <a:xfrm>
+            <a:off x="5391676" y="6201488"/>
+            <a:ext cx="680598" cy="584775"/>
+          </a:xfrm>
+          <a:prstGeom prst="rect">
+            <a:avLst/>
+          </a:prstGeom>
+          <a:noFill/>
+        </p:spPr>
+        <p:txBody>
+          <a:bodyPr wrap="square" rtlCol="0">
+            <a:spAutoFit/>
+          </a:bodyPr>
+          <a:lstStyle/>
+          <a:p>
+            <a:pPr algn="ctr"/>
+            <a:r>
+              <a:rPr lang="fr-FR" sz="3200" dirty="0" smtClean="0">
+                <a:latin typeface="Arial Black" panose="020B0A04020102020204" pitchFamily="34" charset="0"/>
+              </a:rPr>
+              <a:t>8</a:t>
+            </a:r>
+            <a:endParaRPr lang="fr-FR" sz="3200" dirty="0">
+              <a:latin typeface="Arial Black" panose="020B0A04020102020204" pitchFamily="34" charset="0"/>
+            </a:endParaRPr>
+          </a:p>
+        </p:txBody>
+      </p:sp>
     </p:spTree>
     <p:extLst>
       <p:ext uri="{BB962C8B-B14F-4D97-AF65-F5344CB8AC3E}">
@@ -11011,6 +11469,625 @@
     <p:extLst>
       <p:ext uri="{BB962C8B-B14F-4D97-AF65-F5344CB8AC3E}">
         <p14:creationId xmlns:p14="http://schemas.microsoft.com/office/powerpoint/2010/main" val="2670636756"/>
+      </p:ext>
+    </p:extLst>
+  </p:cSld>
+  <p:clrMapOvr>
+    <a:masterClrMapping/>
+  </p:clrMapOvr>
+</p:sld>
+</file>
+
+<file path=ppt/slides/slide4.xml><?xml version="1.0" encoding="utf-8"?>
+<p:sld xmlns:a="http://schemas.openxmlformats.org/drawingml/2006/main" xmlns:r="http://schemas.openxmlformats.org/officeDocument/2006/relationships" xmlns:p="http://schemas.openxmlformats.org/presentationml/2006/main">
+  <p:cSld>
+    <p:spTree>
+      <p:nvGrpSpPr>
+        <p:cNvPr id="1" name=""/>
+        <p:cNvGrpSpPr/>
+        <p:nvPr/>
+      </p:nvGrpSpPr>
+      <p:grpSpPr>
+        <a:xfrm>
+          <a:off x="0" y="0"/>
+          <a:ext cx="0" cy="0"/>
+          <a:chOff x="0" y="0"/>
+          <a:chExt cx="0" cy="0"/>
+        </a:xfrm>
+      </p:grpSpPr>
+      <p:sp>
+        <p:nvSpPr>
+          <p:cNvPr id="2" name="Titre 1"/>
+          <p:cNvSpPr>
+            <a:spLocks noGrp="1"/>
+          </p:cNvSpPr>
+          <p:nvPr>
+            <p:ph type="title"/>
+          </p:nvPr>
+        </p:nvSpPr>
+        <p:spPr/>
+        <p:txBody>
+          <a:bodyPr/>
+          <a:lstStyle/>
+          <a:p>
+            <a:pPr algn="ctr"/>
+            <a:r>
+              <a:rPr lang="fr-FR" b="1" dirty="0" smtClean="0"/>
+              <a:t>Police utiliser</a:t>
+            </a:r>
+            <a:endParaRPr lang="fr-FR" b="1" dirty="0"/>
+          </a:p>
+        </p:txBody>
+      </p:sp>
+      <p:sp>
+        <p:nvSpPr>
+          <p:cNvPr id="5" name="ZoneTexte 4"/>
+          <p:cNvSpPr txBox="1"/>
+          <p:nvPr/>
+        </p:nvSpPr>
+        <p:spPr>
+          <a:xfrm>
+            <a:off x="1337481" y="1897039"/>
+            <a:ext cx="6400800" cy="369332"/>
+          </a:xfrm>
+          <a:prstGeom prst="rect">
+            <a:avLst/>
+          </a:prstGeom>
+          <a:noFill/>
+        </p:spPr>
+        <p:txBody>
+          <a:bodyPr wrap="square" rtlCol="0">
+            <a:spAutoFit/>
+          </a:bodyPr>
+          <a:lstStyle/>
+          <a:p>
+            <a:r>
+              <a:rPr lang="fr-FR" dirty="0" smtClean="0">
+                <a:latin typeface="Glycerin"/>
+                <a:cs typeface="Arial" panose="020B0604020202020204" pitchFamily="34" charset="0"/>
+              </a:rPr>
+              <a:t>Calibri</a:t>
+            </a:r>
+            <a:endParaRPr lang="fr-FR" dirty="0">
+              <a:latin typeface="Glycerin"/>
+              <a:cs typeface="Arial" panose="020B0604020202020204" pitchFamily="34" charset="0"/>
+            </a:endParaRPr>
+          </a:p>
+        </p:txBody>
+      </p:sp>
+    </p:spTree>
+    <p:extLst>
+      <p:ext uri="{BB962C8B-B14F-4D97-AF65-F5344CB8AC3E}">
+        <p14:creationId xmlns:p14="http://schemas.microsoft.com/office/powerpoint/2010/main" val="2320138731"/>
+      </p:ext>
+    </p:extLst>
+  </p:cSld>
+  <p:clrMapOvr>
+    <a:masterClrMapping/>
+  </p:clrMapOvr>
+</p:sld>
+</file>
+
+<file path=ppt/slides/slide5.xml><?xml version="1.0" encoding="utf-8"?>
+<p:sld xmlns:a="http://schemas.openxmlformats.org/drawingml/2006/main" xmlns:r="http://schemas.openxmlformats.org/officeDocument/2006/relationships" xmlns:p="http://schemas.openxmlformats.org/presentationml/2006/main">
+  <p:cSld>
+    <p:spTree>
+      <p:nvGrpSpPr>
+        <p:cNvPr id="1" name=""/>
+        <p:cNvGrpSpPr/>
+        <p:nvPr/>
+      </p:nvGrpSpPr>
+      <p:grpSpPr>
+        <a:xfrm>
+          <a:off x="0" y="0"/>
+          <a:ext cx="0" cy="0"/>
+          <a:chOff x="0" y="0"/>
+          <a:chExt cx="0" cy="0"/>
+        </a:xfrm>
+      </p:grpSpPr>
+      <p:sp>
+        <p:nvSpPr>
+          <p:cNvPr id="4" name="ZoneTexte 3"/>
+          <p:cNvSpPr txBox="1"/>
+          <p:nvPr/>
+        </p:nvSpPr>
+        <p:spPr>
+          <a:xfrm>
+            <a:off x="2667000" y="850900"/>
+            <a:ext cx="5600700" cy="523220"/>
+          </a:xfrm>
+          <a:prstGeom prst="rect">
+            <a:avLst/>
+          </a:prstGeom>
+          <a:noFill/>
+        </p:spPr>
+        <p:txBody>
+          <a:bodyPr wrap="square" rtlCol="0">
+            <a:spAutoFit/>
+          </a:bodyPr>
+          <a:lstStyle/>
+          <a:p>
+            <a:pPr algn="ctr"/>
+            <a:r>
+              <a:rPr lang="fr-FR" sz="2800" dirty="0" smtClean="0">
+                <a:latin typeface="Arial Black" panose="020B0A04020102020204" pitchFamily="34" charset="0"/>
+              </a:rPr>
+              <a:t>Taches </a:t>
+            </a:r>
+            <a:endParaRPr lang="fr-FR" sz="2800" dirty="0">
+              <a:latin typeface="Arial Black" panose="020B0A04020102020204" pitchFamily="34" charset="0"/>
+            </a:endParaRPr>
+          </a:p>
+        </p:txBody>
+      </p:sp>
+      <p:sp>
+        <p:nvSpPr>
+          <p:cNvPr id="5" name="ZoneTexte 4"/>
+          <p:cNvSpPr txBox="1"/>
+          <p:nvPr/>
+        </p:nvSpPr>
+        <p:spPr>
+          <a:xfrm>
+            <a:off x="-254000" y="1765300"/>
+            <a:ext cx="2705100" cy="523220"/>
+          </a:xfrm>
+          <a:prstGeom prst="rect">
+            <a:avLst/>
+          </a:prstGeom>
+          <a:noFill/>
+        </p:spPr>
+        <p:txBody>
+          <a:bodyPr wrap="square" rtlCol="0">
+            <a:spAutoFit/>
+          </a:bodyPr>
+          <a:lstStyle/>
+          <a:p>
+            <a:pPr algn="ctr"/>
+            <a:r>
+              <a:rPr lang="fr-FR" sz="2400" dirty="0" smtClean="0">
+                <a:latin typeface="Arial Black" panose="020B0A04020102020204" pitchFamily="34" charset="0"/>
+              </a:rPr>
+              <a:t>Groupe 1:</a:t>
+            </a:r>
+            <a:r>
+              <a:rPr lang="fr-FR" sz="2800" dirty="0" smtClean="0">
+                <a:latin typeface="Arial Black" panose="020B0A04020102020204" pitchFamily="34" charset="0"/>
+              </a:rPr>
+              <a:t> </a:t>
+            </a:r>
+            <a:endParaRPr lang="fr-FR" sz="2800" dirty="0">
+              <a:latin typeface="Arial Black" panose="020B0A04020102020204" pitchFamily="34" charset="0"/>
+            </a:endParaRPr>
+          </a:p>
+        </p:txBody>
+      </p:sp>
+      <p:sp>
+        <p:nvSpPr>
+          <p:cNvPr id="6" name="ZoneTexte 5"/>
+          <p:cNvSpPr txBox="1"/>
+          <p:nvPr/>
+        </p:nvSpPr>
+        <p:spPr>
+          <a:xfrm>
+            <a:off x="-234950" y="2418040"/>
+            <a:ext cx="2705100" cy="523220"/>
+          </a:xfrm>
+          <a:prstGeom prst="rect">
+            <a:avLst/>
+          </a:prstGeom>
+          <a:noFill/>
+        </p:spPr>
+        <p:txBody>
+          <a:bodyPr wrap="square" rtlCol="0">
+            <a:spAutoFit/>
+          </a:bodyPr>
+          <a:lstStyle/>
+          <a:p>
+            <a:pPr algn="ctr"/>
+            <a:r>
+              <a:rPr lang="fr-FR" sz="2400" dirty="0" smtClean="0">
+                <a:latin typeface="Arial Black" panose="020B0A04020102020204" pitchFamily="34" charset="0"/>
+              </a:rPr>
+              <a:t>Groupe 2:</a:t>
+            </a:r>
+            <a:r>
+              <a:rPr lang="fr-FR" sz="2800" dirty="0" smtClean="0">
+                <a:latin typeface="Arial Black" panose="020B0A04020102020204" pitchFamily="34" charset="0"/>
+              </a:rPr>
+              <a:t> </a:t>
+            </a:r>
+            <a:endParaRPr lang="fr-FR" sz="2800" dirty="0">
+              <a:latin typeface="Arial Black" panose="020B0A04020102020204" pitchFamily="34" charset="0"/>
+            </a:endParaRPr>
+          </a:p>
+        </p:txBody>
+      </p:sp>
+      <p:sp>
+        <p:nvSpPr>
+          <p:cNvPr id="7" name="ZoneTexte 6"/>
+          <p:cNvSpPr txBox="1"/>
+          <p:nvPr/>
+        </p:nvSpPr>
+        <p:spPr>
+          <a:xfrm>
+            <a:off x="-234950" y="3907820"/>
+            <a:ext cx="2705100" cy="523220"/>
+          </a:xfrm>
+          <a:prstGeom prst="rect">
+            <a:avLst/>
+          </a:prstGeom>
+          <a:noFill/>
+        </p:spPr>
+        <p:txBody>
+          <a:bodyPr wrap="square" rtlCol="0">
+            <a:spAutoFit/>
+          </a:bodyPr>
+          <a:lstStyle/>
+          <a:p>
+            <a:pPr algn="ctr"/>
+            <a:r>
+              <a:rPr lang="fr-FR" sz="2400" dirty="0" smtClean="0">
+                <a:latin typeface="Arial Black" panose="020B0A04020102020204" pitchFamily="34" charset="0"/>
+              </a:rPr>
+              <a:t>Groupe 4:</a:t>
+            </a:r>
+            <a:r>
+              <a:rPr lang="fr-FR" sz="2800" dirty="0" smtClean="0">
+                <a:latin typeface="Arial Black" panose="020B0A04020102020204" pitchFamily="34" charset="0"/>
+              </a:rPr>
+              <a:t> </a:t>
+            </a:r>
+            <a:endParaRPr lang="fr-FR" sz="2800" dirty="0">
+              <a:latin typeface="Arial Black" panose="020B0A04020102020204" pitchFamily="34" charset="0"/>
+            </a:endParaRPr>
+          </a:p>
+        </p:txBody>
+      </p:sp>
+      <p:sp>
+        <p:nvSpPr>
+          <p:cNvPr id="9" name="ZoneTexte 8"/>
+          <p:cNvSpPr txBox="1"/>
+          <p:nvPr/>
+        </p:nvSpPr>
+        <p:spPr>
+          <a:xfrm>
+            <a:off x="-234950" y="4575125"/>
+            <a:ext cx="2705100" cy="523220"/>
+          </a:xfrm>
+          <a:prstGeom prst="rect">
+            <a:avLst/>
+          </a:prstGeom>
+          <a:noFill/>
+        </p:spPr>
+        <p:txBody>
+          <a:bodyPr wrap="square" rtlCol="0">
+            <a:spAutoFit/>
+          </a:bodyPr>
+          <a:lstStyle/>
+          <a:p>
+            <a:pPr algn="ctr"/>
+            <a:r>
+              <a:rPr lang="fr-FR" sz="2400" dirty="0" smtClean="0">
+                <a:latin typeface="Arial Black" panose="020B0A04020102020204" pitchFamily="34" charset="0"/>
+              </a:rPr>
+              <a:t>Groupe 5:</a:t>
+            </a:r>
+            <a:r>
+              <a:rPr lang="fr-FR" sz="2800" dirty="0" smtClean="0">
+                <a:latin typeface="Arial Black" panose="020B0A04020102020204" pitchFamily="34" charset="0"/>
+              </a:rPr>
+              <a:t> </a:t>
+            </a:r>
+            <a:endParaRPr lang="fr-FR" sz="2800" dirty="0">
+              <a:latin typeface="Arial Black" panose="020B0A04020102020204" pitchFamily="34" charset="0"/>
+            </a:endParaRPr>
+          </a:p>
+        </p:txBody>
+      </p:sp>
+      <p:sp>
+        <p:nvSpPr>
+          <p:cNvPr id="10" name="ZoneTexte 9"/>
+          <p:cNvSpPr txBox="1"/>
+          <p:nvPr/>
+        </p:nvSpPr>
+        <p:spPr>
+          <a:xfrm>
+            <a:off x="-234950" y="3102630"/>
+            <a:ext cx="2705100" cy="523220"/>
+          </a:xfrm>
+          <a:prstGeom prst="rect">
+            <a:avLst/>
+          </a:prstGeom>
+          <a:noFill/>
+        </p:spPr>
+        <p:txBody>
+          <a:bodyPr wrap="square" rtlCol="0">
+            <a:spAutoFit/>
+          </a:bodyPr>
+          <a:lstStyle/>
+          <a:p>
+            <a:pPr algn="ctr"/>
+            <a:r>
+              <a:rPr lang="fr-FR" sz="2400" dirty="0" smtClean="0">
+                <a:latin typeface="Arial Black" panose="020B0A04020102020204" pitchFamily="34" charset="0"/>
+              </a:rPr>
+              <a:t>Groupe 3:</a:t>
+            </a:r>
+            <a:r>
+              <a:rPr lang="fr-FR" sz="2800" dirty="0" smtClean="0">
+                <a:latin typeface="Arial Black" panose="020B0A04020102020204" pitchFamily="34" charset="0"/>
+              </a:rPr>
+              <a:t> </a:t>
+            </a:r>
+            <a:endParaRPr lang="fr-FR" sz="2800" dirty="0">
+              <a:latin typeface="Arial Black" panose="020B0A04020102020204" pitchFamily="34" charset="0"/>
+            </a:endParaRPr>
+          </a:p>
+        </p:txBody>
+      </p:sp>
+      <p:sp>
+        <p:nvSpPr>
+          <p:cNvPr id="11" name="ZoneTexte 10"/>
+          <p:cNvSpPr txBox="1"/>
+          <p:nvPr/>
+        </p:nvSpPr>
+        <p:spPr>
+          <a:xfrm>
+            <a:off x="1892300" y="1825847"/>
+            <a:ext cx="4635500" cy="461665"/>
+          </a:xfrm>
+          <a:prstGeom prst="rect">
+            <a:avLst/>
+          </a:prstGeom>
+          <a:noFill/>
+        </p:spPr>
+        <p:txBody>
+          <a:bodyPr wrap="square" rtlCol="0">
+            <a:spAutoFit/>
+          </a:bodyPr>
+          <a:lstStyle/>
+          <a:p>
+            <a:pPr algn="ctr"/>
+            <a:r>
+              <a:rPr lang="fr-FR" sz="2400" dirty="0" smtClean="0">
+                <a:solidFill>
+                  <a:schemeClr val="tx1">
+                    <a:lumMod val="50000"/>
+                    <a:lumOff val="50000"/>
+                  </a:schemeClr>
+                </a:solidFill>
+                <a:latin typeface="Arial Black" panose="020B0A04020102020204" pitchFamily="34" charset="0"/>
+              </a:rPr>
+              <a:t>Structure générale</a:t>
+            </a:r>
+            <a:endParaRPr lang="fr-FR" sz="2800" dirty="0">
+              <a:solidFill>
+                <a:schemeClr val="tx1">
+                  <a:lumMod val="50000"/>
+                  <a:lumOff val="50000"/>
+                </a:schemeClr>
+              </a:solidFill>
+              <a:latin typeface="Arial Black" panose="020B0A04020102020204" pitchFamily="34" charset="0"/>
+            </a:endParaRPr>
+          </a:p>
+        </p:txBody>
+      </p:sp>
+      <p:sp>
+        <p:nvSpPr>
+          <p:cNvPr id="12" name="ZoneTexte 11"/>
+          <p:cNvSpPr txBox="1"/>
+          <p:nvPr/>
+        </p:nvSpPr>
+        <p:spPr>
+          <a:xfrm>
+            <a:off x="1892300" y="2541764"/>
+            <a:ext cx="2705100" cy="461665"/>
+          </a:xfrm>
+          <a:prstGeom prst="rect">
+            <a:avLst/>
+          </a:prstGeom>
+          <a:noFill/>
+        </p:spPr>
+        <p:txBody>
+          <a:bodyPr wrap="square" rtlCol="0">
+            <a:spAutoFit/>
+          </a:bodyPr>
+          <a:lstStyle/>
+          <a:p>
+            <a:pPr algn="ctr"/>
+            <a:r>
+              <a:rPr lang="fr-FR" sz="2400" dirty="0" smtClean="0">
+                <a:solidFill>
+                  <a:schemeClr val="tx1">
+                    <a:lumMod val="50000"/>
+                    <a:lumOff val="50000"/>
+                  </a:schemeClr>
+                </a:solidFill>
+                <a:latin typeface="Arial Black" panose="020B0A04020102020204" pitchFamily="34" charset="0"/>
+              </a:rPr>
+              <a:t>1 + 2</a:t>
+            </a:r>
+            <a:endParaRPr lang="fr-FR" sz="2800" dirty="0">
+              <a:solidFill>
+                <a:schemeClr val="tx1">
+                  <a:lumMod val="50000"/>
+                  <a:lumOff val="50000"/>
+                </a:schemeClr>
+              </a:solidFill>
+              <a:latin typeface="Arial Black" panose="020B0A04020102020204" pitchFamily="34" charset="0"/>
+            </a:endParaRPr>
+          </a:p>
+        </p:txBody>
+      </p:sp>
+      <p:sp>
+        <p:nvSpPr>
+          <p:cNvPr id="13" name="ZoneTexte 12"/>
+          <p:cNvSpPr txBox="1"/>
+          <p:nvPr/>
+        </p:nvSpPr>
+        <p:spPr>
+          <a:xfrm>
+            <a:off x="1892300" y="3236227"/>
+            <a:ext cx="2705100" cy="461665"/>
+          </a:xfrm>
+          <a:prstGeom prst="rect">
+            <a:avLst/>
+          </a:prstGeom>
+          <a:noFill/>
+        </p:spPr>
+        <p:txBody>
+          <a:bodyPr wrap="square" rtlCol="0">
+            <a:spAutoFit/>
+          </a:bodyPr>
+          <a:lstStyle/>
+          <a:p>
+            <a:pPr algn="ctr"/>
+            <a:r>
+              <a:rPr lang="fr-FR" sz="2400" dirty="0">
+                <a:solidFill>
+                  <a:schemeClr val="tx1">
+                    <a:lumMod val="50000"/>
+                    <a:lumOff val="50000"/>
+                  </a:schemeClr>
+                </a:solidFill>
+                <a:latin typeface="Arial Black" panose="020B0A04020102020204" pitchFamily="34" charset="0"/>
+              </a:rPr>
+              <a:t>3</a:t>
+            </a:r>
+            <a:r>
+              <a:rPr lang="fr-FR" sz="2400" dirty="0" smtClean="0">
+                <a:solidFill>
+                  <a:schemeClr val="tx1">
+                    <a:lumMod val="50000"/>
+                    <a:lumOff val="50000"/>
+                  </a:schemeClr>
+                </a:solidFill>
+                <a:latin typeface="Arial Black" panose="020B0A04020102020204" pitchFamily="34" charset="0"/>
+              </a:rPr>
+              <a:t> + 6</a:t>
+            </a:r>
+            <a:endParaRPr lang="fr-FR" sz="2800" dirty="0">
+              <a:solidFill>
+                <a:schemeClr val="tx1">
+                  <a:lumMod val="50000"/>
+                  <a:lumOff val="50000"/>
+                </a:schemeClr>
+              </a:solidFill>
+              <a:latin typeface="Arial Black" panose="020B0A04020102020204" pitchFamily="34" charset="0"/>
+            </a:endParaRPr>
+          </a:p>
+        </p:txBody>
+      </p:sp>
+      <p:sp>
+        <p:nvSpPr>
+          <p:cNvPr id="14" name="ZoneTexte 13"/>
+          <p:cNvSpPr txBox="1"/>
+          <p:nvPr/>
+        </p:nvSpPr>
+        <p:spPr>
+          <a:xfrm>
+            <a:off x="1892300" y="3959652"/>
+            <a:ext cx="2705100" cy="461665"/>
+          </a:xfrm>
+          <a:prstGeom prst="rect">
+            <a:avLst/>
+          </a:prstGeom>
+          <a:noFill/>
+        </p:spPr>
+        <p:txBody>
+          <a:bodyPr wrap="square" rtlCol="0">
+            <a:spAutoFit/>
+          </a:bodyPr>
+          <a:lstStyle/>
+          <a:p>
+            <a:pPr algn="ctr"/>
+            <a:r>
+              <a:rPr lang="fr-FR" sz="2400" dirty="0" smtClean="0">
+                <a:solidFill>
+                  <a:schemeClr val="tx1">
+                    <a:lumMod val="50000"/>
+                    <a:lumOff val="50000"/>
+                  </a:schemeClr>
+                </a:solidFill>
+                <a:latin typeface="Arial Black" panose="020B0A04020102020204" pitchFamily="34" charset="0"/>
+              </a:rPr>
+              <a:t>5</a:t>
+            </a:r>
+            <a:endParaRPr lang="fr-FR" sz="2800" dirty="0">
+              <a:solidFill>
+                <a:schemeClr val="tx1">
+                  <a:lumMod val="50000"/>
+                  <a:lumOff val="50000"/>
+                </a:schemeClr>
+              </a:solidFill>
+              <a:latin typeface="Arial Black" panose="020B0A04020102020204" pitchFamily="34" charset="0"/>
+            </a:endParaRPr>
+          </a:p>
+        </p:txBody>
+      </p:sp>
+      <p:sp>
+        <p:nvSpPr>
+          <p:cNvPr id="15" name="ZoneTexte 14"/>
+          <p:cNvSpPr txBox="1"/>
+          <p:nvPr/>
+        </p:nvSpPr>
+        <p:spPr>
+          <a:xfrm>
+            <a:off x="1892300" y="4669249"/>
+            <a:ext cx="2705100" cy="461665"/>
+          </a:xfrm>
+          <a:prstGeom prst="rect">
+            <a:avLst/>
+          </a:prstGeom>
+          <a:noFill/>
+        </p:spPr>
+        <p:txBody>
+          <a:bodyPr wrap="square" rtlCol="0">
+            <a:spAutoFit/>
+          </a:bodyPr>
+          <a:lstStyle/>
+          <a:p>
+            <a:pPr algn="ctr"/>
+            <a:r>
+              <a:rPr lang="fr-FR" sz="2400" dirty="0">
+                <a:solidFill>
+                  <a:schemeClr val="tx1">
+                    <a:lumMod val="50000"/>
+                    <a:lumOff val="50000"/>
+                  </a:schemeClr>
+                </a:solidFill>
+                <a:latin typeface="Arial Black" panose="020B0A04020102020204" pitchFamily="34" charset="0"/>
+              </a:rPr>
+              <a:t>7</a:t>
+            </a:r>
+            <a:r>
+              <a:rPr lang="fr-FR" sz="2400" dirty="0" smtClean="0">
+                <a:solidFill>
+                  <a:schemeClr val="tx1">
+                    <a:lumMod val="50000"/>
+                    <a:lumOff val="50000"/>
+                  </a:schemeClr>
+                </a:solidFill>
+                <a:latin typeface="Arial Black" panose="020B0A04020102020204" pitchFamily="34" charset="0"/>
+              </a:rPr>
+              <a:t> + 8</a:t>
+            </a:r>
+            <a:endParaRPr lang="fr-FR" sz="2800" dirty="0">
+              <a:solidFill>
+                <a:schemeClr val="tx1">
+                  <a:lumMod val="50000"/>
+                  <a:lumOff val="50000"/>
+                </a:schemeClr>
+              </a:solidFill>
+              <a:latin typeface="Arial Black" panose="020B0A04020102020204" pitchFamily="34" charset="0"/>
+            </a:endParaRPr>
+          </a:p>
+        </p:txBody>
+      </p:sp>
+    </p:spTree>
+    <p:extLst>
+      <p:ext uri="{BB962C8B-B14F-4D97-AF65-F5344CB8AC3E}">
+        <p14:creationId xmlns:p14="http://schemas.microsoft.com/office/powerpoint/2010/main" val="2235040372"/>
       </p:ext>
     </p:extLst>
   </p:cSld>

</xml_diff>

<commit_message>
Mise à jour main
</commit_message>
<xml_diff>
--- a/UI-model/UI design Fortico.pptx
+++ b/UI-model/UI design Fortico.pptx
@@ -203,7 +203,7 @@
           <a:p>
             <a:fld id="{4D4BAD99-9C6E-438B-B6E2-4A70BF6BDDF4}" type="datetimeFigureOut">
               <a:rPr lang="fr-FR" smtClean="0"/>
-              <a:t>11/05/2025</a:t>
+              <a:t>12/05/2025</a:t>
             </a:fld>
             <a:endParaRPr lang="fr-FR"/>
           </a:p>
@@ -770,7 +770,7 @@
           <a:p>
             <a:fld id="{5F5282B9-BFE5-4D13-8D8C-5297D4C42E3B}" type="datetimeFigureOut">
               <a:rPr lang="fr-FR" smtClean="0"/>
-              <a:t>11/05/2025</a:t>
+              <a:t>12/05/2025</a:t>
             </a:fld>
             <a:endParaRPr lang="fr-FR"/>
           </a:p>
@@ -940,7 +940,7 @@
           <a:p>
             <a:fld id="{5F5282B9-BFE5-4D13-8D8C-5297D4C42E3B}" type="datetimeFigureOut">
               <a:rPr lang="fr-FR" smtClean="0"/>
-              <a:t>11/05/2025</a:t>
+              <a:t>12/05/2025</a:t>
             </a:fld>
             <a:endParaRPr lang="fr-FR"/>
           </a:p>
@@ -1120,7 +1120,7 @@
           <a:p>
             <a:fld id="{5F5282B9-BFE5-4D13-8D8C-5297D4C42E3B}" type="datetimeFigureOut">
               <a:rPr lang="fr-FR" smtClean="0"/>
-              <a:t>11/05/2025</a:t>
+              <a:t>12/05/2025</a:t>
             </a:fld>
             <a:endParaRPr lang="fr-FR"/>
           </a:p>
@@ -1290,7 +1290,7 @@
           <a:p>
             <a:fld id="{5F5282B9-BFE5-4D13-8D8C-5297D4C42E3B}" type="datetimeFigureOut">
               <a:rPr lang="fr-FR" smtClean="0"/>
-              <a:t>11/05/2025</a:t>
+              <a:t>12/05/2025</a:t>
             </a:fld>
             <a:endParaRPr lang="fr-FR"/>
           </a:p>
@@ -1536,7 +1536,7 @@
           <a:p>
             <a:fld id="{5F5282B9-BFE5-4D13-8D8C-5297D4C42E3B}" type="datetimeFigureOut">
               <a:rPr lang="fr-FR" smtClean="0"/>
-              <a:t>11/05/2025</a:t>
+              <a:t>12/05/2025</a:t>
             </a:fld>
             <a:endParaRPr lang="fr-FR"/>
           </a:p>
@@ -1768,7 +1768,7 @@
           <a:p>
             <a:fld id="{5F5282B9-BFE5-4D13-8D8C-5297D4C42E3B}" type="datetimeFigureOut">
               <a:rPr lang="fr-FR" smtClean="0"/>
-              <a:t>11/05/2025</a:t>
+              <a:t>12/05/2025</a:t>
             </a:fld>
             <a:endParaRPr lang="fr-FR"/>
           </a:p>
@@ -2135,7 +2135,7 @@
           <a:p>
             <a:fld id="{5F5282B9-BFE5-4D13-8D8C-5297D4C42E3B}" type="datetimeFigureOut">
               <a:rPr lang="fr-FR" smtClean="0"/>
-              <a:t>11/05/2025</a:t>
+              <a:t>12/05/2025</a:t>
             </a:fld>
             <a:endParaRPr lang="fr-FR"/>
           </a:p>
@@ -2253,7 +2253,7 @@
           <a:p>
             <a:fld id="{5F5282B9-BFE5-4D13-8D8C-5297D4C42E3B}" type="datetimeFigureOut">
               <a:rPr lang="fr-FR" smtClean="0"/>
-              <a:t>11/05/2025</a:t>
+              <a:t>12/05/2025</a:t>
             </a:fld>
             <a:endParaRPr lang="fr-FR"/>
           </a:p>
@@ -2348,7 +2348,7 @@
           <a:p>
             <a:fld id="{5F5282B9-BFE5-4D13-8D8C-5297D4C42E3B}" type="datetimeFigureOut">
               <a:rPr lang="fr-FR" smtClean="0"/>
-              <a:t>11/05/2025</a:t>
+              <a:t>12/05/2025</a:t>
             </a:fld>
             <a:endParaRPr lang="fr-FR"/>
           </a:p>
@@ -2625,7 +2625,7 @@
           <a:p>
             <a:fld id="{5F5282B9-BFE5-4D13-8D8C-5297D4C42E3B}" type="datetimeFigureOut">
               <a:rPr lang="fr-FR" smtClean="0"/>
-              <a:t>11/05/2025</a:t>
+              <a:t>12/05/2025</a:t>
             </a:fld>
             <a:endParaRPr lang="fr-FR"/>
           </a:p>
@@ -2878,7 +2878,7 @@
           <a:p>
             <a:fld id="{5F5282B9-BFE5-4D13-8D8C-5297D4C42E3B}" type="datetimeFigureOut">
               <a:rPr lang="fr-FR" smtClean="0"/>
-              <a:t>11/05/2025</a:t>
+              <a:t>12/05/2025</a:t>
             </a:fld>
             <a:endParaRPr lang="fr-FR"/>
           </a:p>
@@ -3091,7 +3091,7 @@
           <a:p>
             <a:fld id="{5F5282B9-BFE5-4D13-8D8C-5297D4C42E3B}" type="datetimeFigureOut">
               <a:rPr lang="fr-FR" smtClean="0"/>
-              <a:t>11/05/2025</a:t>
+              <a:t>12/05/2025</a:t>
             </a:fld>
             <a:endParaRPr lang="fr-FR"/>
           </a:p>
@@ -4820,15 +4820,7 @@
                   <a:srgbClr val="D5D5D5"/>
                 </a:solidFill>
               </a:rPr>
-              <a:t>70</a:t>
-            </a:r>
-            <a:r>
-              <a:rPr lang="fr-FR" sz="2200" b="1" dirty="0" smtClean="0">
-                <a:solidFill>
-                  <a:srgbClr val="D5D5D5"/>
-                </a:solidFill>
-              </a:rPr>
-              <a:t>%</a:t>
+              <a:t>70%</a:t>
             </a:r>
             <a:endParaRPr lang="fr-FR" sz="2200" b="1" dirty="0">
               <a:solidFill>
@@ -7865,15 +7857,7 @@
                   <a:srgbClr val="D5D5D5"/>
                 </a:solidFill>
               </a:rPr>
-              <a:t>00</a:t>
-            </a:r>
-            <a:r>
-              <a:rPr lang="fr-FR" sz="2200" b="1" dirty="0" smtClean="0">
-                <a:solidFill>
-                  <a:srgbClr val="D5D5D5"/>
-                </a:solidFill>
-              </a:rPr>
-              <a:t>%</a:t>
+              <a:t>00%</a:t>
             </a:r>
             <a:endParaRPr lang="fr-FR" sz="2200" b="1" dirty="0">
               <a:solidFill>
@@ -7911,15 +7895,7 @@
                   <a:srgbClr val="D5D5D5"/>
                 </a:solidFill>
               </a:rPr>
-              <a:t>00</a:t>
-            </a:r>
-            <a:r>
-              <a:rPr lang="fr-FR" sz="2200" b="1" dirty="0" smtClean="0">
-                <a:solidFill>
-                  <a:srgbClr val="D5D5D5"/>
-                </a:solidFill>
-              </a:rPr>
-              <a:t>°C</a:t>
+              <a:t>00°C</a:t>
             </a:r>
             <a:endParaRPr lang="fr-FR" sz="2200" b="1" dirty="0">
               <a:solidFill>
@@ -7965,15 +7941,7 @@
                   <a:srgbClr val="D5D5D5"/>
                 </a:solidFill>
               </a:rPr>
-              <a:t>0</a:t>
-            </a:r>
-            <a:r>
-              <a:rPr lang="fr-FR" sz="2200" b="1" dirty="0" smtClean="0">
-                <a:solidFill>
-                  <a:srgbClr val="D5D5D5"/>
-                </a:solidFill>
-              </a:rPr>
-              <a:t>%</a:t>
+              <a:t>0%</a:t>
             </a:r>
             <a:endParaRPr lang="fr-FR" sz="2200" b="1" dirty="0">
               <a:solidFill>
@@ -8063,44 +8031,6 @@
       </p:sp>
       <p:sp>
         <p:nvSpPr>
-          <p:cNvPr id="57" name="ZoneTexte 56"/>
-          <p:cNvSpPr txBox="1"/>
-          <p:nvPr/>
-        </p:nvSpPr>
-        <p:spPr>
-          <a:xfrm>
-            <a:off x="7925246" y="2103513"/>
-            <a:ext cx="1001867" cy="276999"/>
-          </a:xfrm>
-          <a:prstGeom prst="rect">
-            <a:avLst/>
-          </a:prstGeom>
-          <a:noFill/>
-        </p:spPr>
-        <p:txBody>
-          <a:bodyPr wrap="square" rtlCol="0">
-            <a:spAutoFit/>
-          </a:bodyPr>
-          <a:lstStyle/>
-          <a:p>
-            <a:r>
-              <a:rPr lang="fr-FR" sz="1200" b="1" dirty="0" smtClean="0">
-                <a:solidFill>
-                  <a:schemeClr val="bg1"/>
-                </a:solidFill>
-              </a:rPr>
-              <a:t>Bedroom +</a:t>
-            </a:r>
-            <a:endParaRPr lang="fr-FR" sz="1200" b="1" dirty="0">
-              <a:solidFill>
-                <a:schemeClr val="bg1"/>
-              </a:solidFill>
-            </a:endParaRPr>
-          </a:p>
-        </p:txBody>
-      </p:sp>
-      <p:sp>
-        <p:nvSpPr>
           <p:cNvPr id="58" name="Rectangle à coins arrondis 57"/>
           <p:cNvSpPr/>
           <p:nvPr/>
@@ -8151,90 +8081,6 @@
       </p:sp>
       <p:sp>
         <p:nvSpPr>
-          <p:cNvPr id="59" name="ZoneTexte 58"/>
-          <p:cNvSpPr txBox="1"/>
-          <p:nvPr/>
-        </p:nvSpPr>
-        <p:spPr>
-          <a:xfrm>
-            <a:off x="8996763" y="2141984"/>
-            <a:ext cx="350169" cy="200055"/>
-          </a:xfrm>
-          <a:prstGeom prst="rect">
-            <a:avLst/>
-          </a:prstGeom>
-          <a:noFill/>
-        </p:spPr>
-        <p:txBody>
-          <a:bodyPr wrap="square" rtlCol="0">
-            <a:spAutoFit/>
-          </a:bodyPr>
-          <a:lstStyle/>
-          <a:p>
-            <a:r>
-              <a:rPr lang="fr-FR" sz="700" dirty="0" smtClean="0">
-                <a:solidFill>
-                  <a:srgbClr val="D5D5D5"/>
-                </a:solidFill>
-              </a:rPr>
-              <a:t>Live</a:t>
-            </a:r>
-            <a:endParaRPr lang="fr-FR" sz="700" dirty="0">
-              <a:solidFill>
-                <a:srgbClr val="D5D5D5"/>
-              </a:solidFill>
-            </a:endParaRPr>
-          </a:p>
-        </p:txBody>
-      </p:sp>
-      <p:sp>
-        <p:nvSpPr>
-          <p:cNvPr id="60" name="Ellipse 59"/>
-          <p:cNvSpPr/>
-          <p:nvPr/>
-        </p:nvSpPr>
-        <p:spPr>
-          <a:xfrm>
-            <a:off x="8998011" y="2229485"/>
-            <a:ext cx="45719" cy="45719"/>
-          </a:xfrm>
-          <a:prstGeom prst="ellipse">
-            <a:avLst/>
-          </a:prstGeom>
-          <a:solidFill>
-            <a:srgbClr val="FF0000"/>
-          </a:solidFill>
-          <a:ln>
-            <a:noFill/>
-          </a:ln>
-        </p:spPr>
-        <p:style>
-          <a:lnRef idx="2">
-            <a:schemeClr val="accent1">
-              <a:shade val="50000"/>
-            </a:schemeClr>
-          </a:lnRef>
-          <a:fillRef idx="1">
-            <a:schemeClr val="accent1"/>
-          </a:fillRef>
-          <a:effectRef idx="0">
-            <a:schemeClr val="accent1"/>
-          </a:effectRef>
-          <a:fontRef idx="minor">
-            <a:schemeClr val="lt1"/>
-          </a:fontRef>
-        </p:style>
-        <p:txBody>
-          <a:bodyPr rtlCol="0" anchor="ctr"/>
-          <a:lstStyle/>
-          <a:p>
-            <a:pPr algn="ctr"/>
-            <a:endParaRPr lang="fr-FR"/>
-          </a:p>
-        </p:txBody>
-      </p:sp>
-      <p:sp>
-        <p:nvSpPr>
           <p:cNvPr id="61" name="Rectangle à coins arrondis 60"/>
           <p:cNvSpPr/>
           <p:nvPr/>
@@ -8285,60 +8131,6 @@
       </p:sp>
       <p:sp>
         <p:nvSpPr>
-          <p:cNvPr id="62" name="ZoneTexte 61"/>
-          <p:cNvSpPr txBox="1"/>
-          <p:nvPr/>
-        </p:nvSpPr>
-        <p:spPr>
-          <a:xfrm>
-            <a:off x="9346931" y="2141984"/>
-            <a:ext cx="442387" cy="200055"/>
-          </a:xfrm>
-          <a:prstGeom prst="rect">
-            <a:avLst/>
-          </a:prstGeom>
-          <a:noFill/>
-        </p:spPr>
-        <p:txBody>
-          <a:bodyPr wrap="square" rtlCol="0">
-            <a:spAutoFit/>
-          </a:bodyPr>
-          <a:lstStyle/>
-          <a:p>
-            <a:r>
-              <a:rPr lang="fr-FR" sz="700" dirty="0" smtClean="0">
-                <a:solidFill>
-                  <a:srgbClr val="D5D5D5"/>
-                </a:solidFill>
-              </a:rPr>
-              <a:t>FHD  </a:t>
-            </a:r>
-            <a:r>
-              <a:rPr lang="fr-FR" sz="600" dirty="0" smtClean="0">
-                <a:solidFill>
-                  <a:srgbClr val="D5D5D5"/>
-                </a:solidFill>
-              </a:rPr>
-              <a:t>˅</a:t>
-            </a:r>
-            <a:r>
-              <a:rPr lang="fr-FR" sz="700" dirty="0" smtClean="0">
-                <a:solidFill>
-                  <a:srgbClr val="D5D5D5"/>
-                </a:solidFill>
-              </a:rPr>
-              <a:t> </a:t>
-            </a:r>
-            <a:endParaRPr lang="fr-FR" sz="700" dirty="0">
-              <a:solidFill>
-                <a:srgbClr val="D5D5D5"/>
-              </a:solidFill>
-            </a:endParaRPr>
-          </a:p>
-        </p:txBody>
-      </p:sp>
-      <p:sp>
-        <p:nvSpPr>
           <p:cNvPr id="69" name="Rectangle à coins arrondis 68"/>
           <p:cNvSpPr/>
           <p:nvPr/>
@@ -8376,135 +8168,6 @@
           </a:effectRef>
           <a:fontRef idx="minor">
             <a:schemeClr val="lt1"/>
-          </a:fontRef>
-        </p:style>
-        <p:txBody>
-          <a:bodyPr rtlCol="0" anchor="ctr"/>
-          <a:lstStyle/>
-          <a:p>
-            <a:pPr algn="ctr"/>
-            <a:endParaRPr lang="fr-FR"/>
-          </a:p>
-        </p:txBody>
-      </p:sp>
-      <p:sp>
-        <p:nvSpPr>
-          <p:cNvPr id="70" name="ZoneTexte 69"/>
-          <p:cNvSpPr txBox="1"/>
-          <p:nvPr/>
-        </p:nvSpPr>
-        <p:spPr>
-          <a:xfrm>
-            <a:off x="8090778" y="3649675"/>
-            <a:ext cx="474478" cy="161583"/>
-          </a:xfrm>
-          <a:prstGeom prst="rect">
-            <a:avLst/>
-          </a:prstGeom>
-          <a:noFill/>
-        </p:spPr>
-        <p:txBody>
-          <a:bodyPr wrap="square" rtlCol="0">
-            <a:spAutoFit/>
-          </a:bodyPr>
-          <a:lstStyle/>
-          <a:p>
-            <a:r>
-              <a:rPr lang="fr-FR" sz="450" dirty="0" smtClean="0">
-                <a:solidFill>
-                  <a:schemeClr val="bg1"/>
-                </a:solidFill>
-              </a:rPr>
-              <a:t>Full screen</a:t>
-            </a:r>
-            <a:endParaRPr lang="fr-FR" sz="450" dirty="0">
-              <a:solidFill>
-                <a:schemeClr val="bg1"/>
-              </a:solidFill>
-            </a:endParaRPr>
-          </a:p>
-        </p:txBody>
-      </p:sp>
-      <p:sp>
-        <p:nvSpPr>
-          <p:cNvPr id="71" name="Ellipse 70"/>
-          <p:cNvSpPr/>
-          <p:nvPr/>
-        </p:nvSpPr>
-        <p:spPr>
-          <a:xfrm>
-            <a:off x="8082476" y="3686330"/>
-            <a:ext cx="87505" cy="88271"/>
-          </a:xfrm>
-          <a:prstGeom prst="ellipse">
-            <a:avLst/>
-          </a:prstGeom>
-          <a:solidFill>
-            <a:srgbClr val="6B6B6B">
-              <a:alpha val="83137"/>
-            </a:srgbClr>
-          </a:solidFill>
-          <a:ln>
-            <a:noFill/>
-          </a:ln>
-        </p:spPr>
-        <p:style>
-          <a:lnRef idx="2">
-            <a:schemeClr val="accent1">
-              <a:shade val="50000"/>
-            </a:schemeClr>
-          </a:lnRef>
-          <a:fillRef idx="1">
-            <a:schemeClr val="accent1"/>
-          </a:fillRef>
-          <a:effectRef idx="0">
-            <a:schemeClr val="accent1"/>
-          </a:effectRef>
-          <a:fontRef idx="minor">
-            <a:schemeClr val="lt1"/>
-          </a:fontRef>
-        </p:style>
-        <p:txBody>
-          <a:bodyPr rtlCol="0" anchor="ctr"/>
-          <a:lstStyle/>
-          <a:p>
-            <a:pPr algn="ctr"/>
-            <a:endParaRPr lang="fr-FR"/>
-          </a:p>
-        </p:txBody>
-      </p:sp>
-      <p:sp>
-        <p:nvSpPr>
-          <p:cNvPr id="72" name="Parenthèses 71"/>
-          <p:cNvSpPr/>
-          <p:nvPr/>
-        </p:nvSpPr>
-        <p:spPr>
-          <a:xfrm>
-            <a:off x="8103368" y="3707605"/>
-            <a:ext cx="45719" cy="45719"/>
-          </a:xfrm>
-          <a:prstGeom prst="bracketPair">
-            <a:avLst/>
-          </a:prstGeom>
-          <a:ln>
-            <a:solidFill>
-              <a:srgbClr val="FFFFFF"/>
-            </a:solidFill>
-          </a:ln>
-        </p:spPr>
-        <p:style>
-          <a:lnRef idx="1">
-            <a:schemeClr val="accent1"/>
-          </a:lnRef>
-          <a:fillRef idx="0">
-            <a:schemeClr val="accent1"/>
-          </a:fillRef>
-          <a:effectRef idx="0">
-            <a:schemeClr val="accent1"/>
-          </a:effectRef>
-          <a:fontRef idx="minor">
-            <a:schemeClr val="tx1"/>
           </a:fontRef>
         </p:style>
         <p:txBody>

</xml_diff>